<commit_message>
info o github EH; update prezentacji
</commit_message>
<xml_diff>
--- a/GIT-prezentacja.pptx
+++ b/GIT-prezentacja.pptx
@@ -2050,7 +2050,7 @@
           <a:p>
             <a:fld id="{955BD558-88E3-4A0D-9DF0-F26577586B0C}" type="datetimeFigureOut">
               <a:rPr lang="pl-PL" smtClean="0"/>
-              <a:t>2025-04-23</a:t>
+              <a:t>2025-10-15</a:t>
             </a:fld>
             <a:endParaRPr lang="pl-PL"/>
           </a:p>
@@ -2228,7 +2228,7 @@
           <a:p>
             <a:fld id="{19C43180-B5B9-4DAD-ABBE-F77A099AFA77}" type="datetimeFigureOut">
               <a:rPr lang="pl-PL" smtClean="0"/>
-              <a:t>2025-04-23</a:t>
+              <a:t>2025-10-15</a:t>
             </a:fld>
             <a:endParaRPr lang="pl-PL"/>
           </a:p>
@@ -2770,9 +2770,9 @@
           <a:bodyPr/>
           <a:lstStyle/>
           <a:p>
-            <a:fld id="{8DCE3C72-FDE3-41B2-A00D-266B2A9525C0}" type="datetime1">
+            <a:fld id="{AF0F9186-8AD3-48F8-94DB-FF64D95EB774}" type="datetime1">
               <a:rPr lang="pl-PL" smtClean="0"/>
-              <a:t>2025-04-23</a:t>
+              <a:t>2025-10-15</a:t>
             </a:fld>
             <a:endParaRPr lang="pl-PL"/>
           </a:p>
@@ -7154,9 +7154,9 @@
           <a:bodyPr/>
           <a:lstStyle/>
           <a:p>
-            <a:fld id="{5A331841-5325-4870-B33B-6CCBCD1042EB}" type="datetime1">
+            <a:fld id="{D52F455F-4C39-45F4-881E-C6A81ACDE771}" type="datetime1">
               <a:rPr lang="pl-PL" smtClean="0"/>
-              <a:t>2025-04-23</a:t>
+              <a:t>2025-10-15</a:t>
             </a:fld>
             <a:endParaRPr lang="pl-PL"/>
           </a:p>
@@ -7467,9 +7467,9 @@
           <a:bodyPr/>
           <a:lstStyle/>
           <a:p>
-            <a:fld id="{F135C8E2-C8D2-4EC9-9365-5EE4527E105E}" type="datetime1">
+            <a:fld id="{ACBE0B72-6B78-40F5-920B-86E7E0744324}" type="datetime1">
               <a:rPr lang="pl-PL" smtClean="0"/>
-              <a:t>2025-04-23</a:t>
+              <a:t>2025-10-15</a:t>
             </a:fld>
             <a:endParaRPr lang="pl-PL"/>
           </a:p>
@@ -7790,9 +7790,9 @@
           <a:bodyPr/>
           <a:lstStyle/>
           <a:p>
-            <a:fld id="{D6331860-1BC4-4540-B189-E3322A711417}" type="datetime1">
+            <a:fld id="{C496D373-4291-49F4-B5D0-07C20B45ABF0}" type="datetime1">
               <a:rPr lang="pl-PL" smtClean="0"/>
-              <a:t>2025-04-23</a:t>
+              <a:t>2025-10-15</a:t>
             </a:fld>
             <a:endParaRPr lang="pl-PL"/>
           </a:p>
@@ -8090,9 +8090,9 @@
           <a:bodyPr/>
           <a:lstStyle/>
           <a:p>
-            <a:fld id="{98387019-508C-4FD0-BD10-C3E14406F516}" type="datetime1">
+            <a:fld id="{200FA3AD-FD89-4637-A38E-4FC12F32AF99}" type="datetime1">
               <a:rPr lang="pl-PL" smtClean="0"/>
-              <a:t>2025-04-23</a:t>
+              <a:t>2025-10-15</a:t>
             </a:fld>
             <a:endParaRPr lang="pl-PL"/>
           </a:p>
@@ -8297,9 +8297,9 @@
           <a:bodyPr/>
           <a:lstStyle/>
           <a:p>
-            <a:fld id="{2508613F-385B-42ED-B8D6-2ABC5C87347D}" type="datetime1">
+            <a:fld id="{8230C4F9-03D0-475D-86D1-D00FED449D95}" type="datetime1">
               <a:rPr lang="pl-PL" smtClean="0"/>
-              <a:t>2025-04-23</a:t>
+              <a:t>2025-10-15</a:t>
             </a:fld>
             <a:endParaRPr lang="pl-PL"/>
           </a:p>
@@ -8492,9 +8492,9 @@
           <a:bodyPr/>
           <a:lstStyle/>
           <a:p>
-            <a:fld id="{F34C0D48-41C2-49C4-BC65-0CE445189CD5}" type="datetime1">
+            <a:fld id="{7C8B98C8-1E25-4E34-81B5-B89AE8A0FAA6}" type="datetime1">
               <a:rPr lang="pl-PL" smtClean="0"/>
-              <a:t>2025-04-23</a:t>
+              <a:t>2025-10-15</a:t>
             </a:fld>
             <a:endParaRPr lang="pl-PL"/>
           </a:p>
@@ -8753,9 +8753,9 @@
             </a:lvl1pPr>
           </a:lstStyle>
           <a:p>
-            <a:fld id="{894DC83B-7837-4C4E-8499-D7630D6C8E8A}" type="datetime1">
+            <a:fld id="{902898CE-80E3-453C-90E5-74AA3E4EC175}" type="datetime1">
               <a:rPr lang="pl-PL" smtClean="0"/>
-              <a:t>2025-04-23</a:t>
+              <a:t>2025-10-15</a:t>
             </a:fld>
             <a:endParaRPr lang="pl-PL"/>
           </a:p>
@@ -9037,9 +9037,9 @@
             </a:lvl1pPr>
           </a:lstStyle>
           <a:p>
-            <a:fld id="{51AF11C9-C879-4A6E-A50D-B9F867FAFA17}" type="datetime1">
+            <a:fld id="{2046AB7A-F3A0-4F7E-BF5C-0B2FF3ADB9B3}" type="datetime1">
               <a:rPr lang="pl-PL" smtClean="0"/>
-              <a:t>2025-04-23</a:t>
+              <a:t>2025-10-15</a:t>
             </a:fld>
             <a:endParaRPr lang="pl-PL"/>
           </a:p>
@@ -9257,9 +9257,9 @@
           <a:bodyPr/>
           <a:lstStyle/>
           <a:p>
-            <a:fld id="{A929E4DF-8B52-45DB-8344-4E2F805AD785}" type="datetime1">
+            <a:fld id="{66C12E77-C910-4058-85F1-1D1E01FA585D}" type="datetime1">
               <a:rPr lang="pl-PL" smtClean="0"/>
-              <a:t>2025-04-23</a:t>
+              <a:t>2025-10-15</a:t>
             </a:fld>
             <a:endParaRPr lang="pl-PL"/>
           </a:p>
@@ -9445,9 +9445,9 @@
           <a:bodyPr/>
           <a:lstStyle/>
           <a:p>
-            <a:fld id="{BB121DBD-8BF3-4E83-83C9-650C9779A8F5}" type="datetime1">
+            <a:fld id="{FA5E32EA-2F36-479D-B5BB-F3510BF8E4B4}" type="datetime1">
               <a:rPr lang="pl-PL" smtClean="0"/>
-              <a:t>2025-04-23</a:t>
+              <a:t>2025-10-15</a:t>
             </a:fld>
             <a:endParaRPr lang="pl-PL"/>
           </a:p>
@@ -9759,9 +9759,9 @@
           <a:bodyPr/>
           <a:lstStyle/>
           <a:p>
-            <a:fld id="{8E09A7B7-46B8-43E4-AEDA-7C3EDFDEA19C}" type="datetime1">
+            <a:fld id="{2BF893A7-4C4E-42CB-837C-D33B8486F31B}" type="datetime1">
               <a:rPr lang="pl-PL" smtClean="0"/>
-              <a:t>2025-04-23</a:t>
+              <a:t>2025-10-15</a:t>
             </a:fld>
             <a:endParaRPr lang="pl-PL"/>
           </a:p>
@@ -9918,9 +9918,9 @@
           <a:bodyPr/>
           <a:lstStyle/>
           <a:p>
-            <a:fld id="{74F63312-4FD5-46D8-A668-60C9FA94ACCF}" type="datetime1">
+            <a:fld id="{5E3B962D-9B27-4B6B-B87E-11836FC4F3CF}" type="datetime1">
               <a:rPr lang="pl-PL" smtClean="0"/>
-              <a:t>2025-04-23</a:t>
+              <a:t>2025-10-15</a:t>
             </a:fld>
             <a:endParaRPr lang="pl-PL"/>
           </a:p>
@@ -10079,9 +10079,9 @@
           <a:bodyPr/>
           <a:lstStyle/>
           <a:p>
-            <a:fld id="{98E2BA0A-F13E-43C1-BF92-8AC7579CC79F}" type="datetime1">
+            <a:fld id="{ECE0AC8E-304C-4803-A41D-C9A88D2250BE}" type="datetime1">
               <a:rPr lang="pl-PL" smtClean="0"/>
-              <a:t>2025-04-23</a:t>
+              <a:t>2025-10-15</a:t>
             </a:fld>
             <a:endParaRPr lang="pl-PL"/>
           </a:p>
@@ -10388,9 +10388,9 @@
           <a:bodyPr/>
           <a:lstStyle/>
           <a:p>
-            <a:fld id="{E5954C9F-91CA-4351-848B-5F75F775D1D6}" type="datetime1">
+            <a:fld id="{723F2778-33E9-4C73-88BA-EFEE52D7375D}" type="datetime1">
               <a:rPr lang="pl-PL" smtClean="0"/>
-              <a:t>2025-04-23</a:t>
+              <a:t>2025-10-15</a:t>
             </a:fld>
             <a:endParaRPr lang="pl-PL"/>
           </a:p>
@@ -10644,9 +10644,9 @@
           <a:bodyPr/>
           <a:lstStyle/>
           <a:p>
-            <a:fld id="{5118AC0A-09D4-4206-84A8-5BDAD5E44FFD}" type="datetime1">
+            <a:fld id="{D436DD03-9C4A-4021-B0A0-478E0FACB057}" type="datetime1">
               <a:rPr lang="pl-PL" smtClean="0"/>
-              <a:t>2025-04-23</a:t>
+              <a:t>2025-10-15</a:t>
             </a:fld>
             <a:endParaRPr lang="pl-PL"/>
           </a:p>
@@ -11015,9 +11015,9 @@
           <a:bodyPr/>
           <a:lstStyle/>
           <a:p>
-            <a:fld id="{49CB8685-86D0-4AF0-875F-4FC8D327D613}" type="datetime1">
+            <a:fld id="{73E7A322-F7DD-41A1-B885-BAFC1A3E9783}" type="datetime1">
               <a:rPr lang="pl-PL" smtClean="0"/>
-              <a:t>2025-04-23</a:t>
+              <a:t>2025-10-15</a:t>
             </a:fld>
             <a:endParaRPr lang="pl-PL"/>
           </a:p>
@@ -11496,9 +11496,9 @@
           <a:bodyPr/>
           <a:lstStyle/>
           <a:p>
-            <a:fld id="{0F15AC31-C037-4A48-B4F1-C705DAAAD623}" type="datetime1">
+            <a:fld id="{04F2886E-2590-4227-97B6-ED055860ED47}" type="datetime1">
               <a:rPr lang="pl-PL" smtClean="0"/>
-              <a:t>2025-04-23</a:t>
+              <a:t>2025-10-15</a:t>
             </a:fld>
             <a:endParaRPr lang="pl-PL"/>
           </a:p>
@@ -11922,9 +11922,9 @@
           <a:bodyPr/>
           <a:lstStyle/>
           <a:p>
-            <a:fld id="{BE9A73FC-5BDD-4306-BB4D-867A38E086B8}" type="datetime1">
+            <a:fld id="{9B6608C5-4B6E-4906-BD15-280A3A776F5F}" type="datetime1">
               <a:rPr lang="pl-PL" smtClean="0"/>
-              <a:t>2025-04-23</a:t>
+              <a:t>2025-10-15</a:t>
             </a:fld>
             <a:endParaRPr lang="pl-PL"/>
           </a:p>
@@ -12278,9 +12278,9 @@
           <a:bodyPr/>
           <a:lstStyle/>
           <a:p>
-            <a:fld id="{5C2691EB-87CC-4953-BDB4-755C9EAEFD94}" type="datetime1">
+            <a:fld id="{B0CDC6B6-9E89-433B-AE03-15221DA1E32C}" type="datetime1">
               <a:rPr lang="pl-PL" smtClean="0"/>
-              <a:t>2025-04-23</a:t>
+              <a:t>2025-10-15</a:t>
             </a:fld>
             <a:endParaRPr lang="pl-PL"/>
           </a:p>
@@ -12635,9 +12635,9 @@
           <a:bodyPr/>
           <a:lstStyle/>
           <a:p>
-            <a:fld id="{C115EA41-C029-4FCB-9733-572E7EBD2585}" type="datetime1">
+            <a:fld id="{52998D59-2578-4965-B563-E0DFB191FA5A}" type="datetime1">
               <a:rPr lang="pl-PL" smtClean="0"/>
-              <a:t>2025-04-23</a:t>
+              <a:t>2025-10-15</a:t>
             </a:fld>
             <a:endParaRPr lang="pl-PL"/>
           </a:p>
@@ -12993,9 +12993,9 @@
           <a:bodyPr/>
           <a:lstStyle/>
           <a:p>
-            <a:fld id="{8DD3CE0A-1784-4EB8-A5E0-485DCCCBF679}" type="datetime1">
+            <a:fld id="{242988A9-AF88-4D2E-AEE7-4B3449A75660}" type="datetime1">
               <a:rPr lang="pl-PL" smtClean="0"/>
-              <a:t>2025-04-23</a:t>
+              <a:t>2025-10-15</a:t>
             </a:fld>
             <a:endParaRPr lang="pl-PL"/>
           </a:p>
@@ -13359,9 +13359,9 @@
           <a:bodyPr/>
           <a:lstStyle/>
           <a:p>
-            <a:fld id="{E0D7B04F-2DDF-4622-ADF2-38CF6CCE194A}" type="datetime1">
+            <a:fld id="{0817C5DB-8BD9-4410-8B8F-4E672EB7F9DB}" type="datetime1">
               <a:rPr lang="pl-PL" smtClean="0"/>
-              <a:t>2025-04-23</a:t>
+              <a:t>2025-10-15</a:t>
             </a:fld>
             <a:endParaRPr lang="pl-PL"/>
           </a:p>
@@ -13552,9 +13552,9 @@
           <a:bodyPr/>
           <a:lstStyle/>
           <a:p>
-            <a:fld id="{79B623F8-F0FD-4AD0-825F-702C87FE538B}" type="datetime1">
+            <a:fld id="{9F4F1F4E-6D5A-4B38-939E-6CC677B636BF}" type="datetime1">
               <a:rPr lang="pl-PL" smtClean="0"/>
-              <a:t>2025-04-23</a:t>
+              <a:t>2025-10-15</a:t>
             </a:fld>
             <a:endParaRPr lang="pl-PL"/>
           </a:p>
@@ -13790,9 +13790,9 @@
           <a:bodyPr/>
           <a:lstStyle/>
           <a:p>
-            <a:fld id="{ED14277D-03DD-47FB-A6AC-B110E9DF72BD}" type="datetime1">
+            <a:fld id="{CBD8CA53-8616-47EA-A665-291B2C129DE9}" type="datetime1">
               <a:rPr lang="pl-PL" smtClean="0"/>
-              <a:t>2025-04-23</a:t>
+              <a:t>2025-10-15</a:t>
             </a:fld>
             <a:endParaRPr lang="pl-PL"/>
           </a:p>
@@ -14094,9 +14094,9 @@
             </a:lvl1pPr>
           </a:lstStyle>
           <a:p>
-            <a:fld id="{6C5AE426-28CA-4D4F-9A39-F28F6832EA32}" type="datetime1">
+            <a:fld id="{0EB9FB0C-1181-4E53-926A-9B5551180E9F}" type="datetime1">
               <a:rPr lang="pl-PL" smtClean="0"/>
-              <a:t>2025-04-23</a:t>
+              <a:t>2025-10-15</a:t>
             </a:fld>
             <a:endParaRPr lang="pl-PL"/>
           </a:p>
@@ -14425,9 +14425,9 @@
             </a:lvl1pPr>
           </a:lstStyle>
           <a:p>
-            <a:fld id="{130AA4EE-C88E-49CA-944A-348C93639B22}" type="datetime1">
+            <a:fld id="{7AC8B5B1-B13A-4E14-A8EE-C00D24933D0D}" type="datetime1">
               <a:rPr lang="pl-PL" smtClean="0"/>
-              <a:t>2025-04-23</a:t>
+              <a:t>2025-10-15</a:t>
             </a:fld>
             <a:endParaRPr lang="pl-PL"/>
           </a:p>
@@ -14692,9 +14692,9 @@
           <a:bodyPr/>
           <a:lstStyle/>
           <a:p>
-            <a:fld id="{7C5EA4AB-2518-478C-B378-0538AC27B06A}" type="datetime1">
+            <a:fld id="{8A89A835-5A30-40C1-8C70-E7A04EADB357}" type="datetime1">
               <a:rPr lang="pl-PL" smtClean="0"/>
-              <a:t>2025-04-23</a:t>
+              <a:t>2025-10-15</a:t>
             </a:fld>
             <a:endParaRPr lang="pl-PL"/>
           </a:p>
@@ -14924,9 +14924,9 @@
           <a:bodyPr/>
           <a:lstStyle/>
           <a:p>
-            <a:fld id="{4FA2110A-12AD-458D-A6F7-71D54A46F762}" type="datetime1">
+            <a:fld id="{C00E24F4-E65A-4C93-8426-1E0F31443A03}" type="datetime1">
               <a:rPr lang="pl-PL" smtClean="0"/>
-              <a:t>2025-04-23</a:t>
+              <a:t>2025-10-15</a:t>
             </a:fld>
             <a:endParaRPr lang="pl-PL"/>
           </a:p>
@@ -15295,9 +15295,9 @@
           <a:bodyPr/>
           <a:lstStyle/>
           <a:p>
-            <a:fld id="{2D7C9931-BD7E-4AB3-B201-1F39C5E2C4FF}" type="datetime1">
+            <a:fld id="{004A9ECF-AF12-434B-9349-6176F44E35C7}" type="datetime1">
               <a:rPr lang="pl-PL" smtClean="0"/>
-              <a:t>2025-04-23</a:t>
+              <a:t>2025-10-15</a:t>
             </a:fld>
             <a:endParaRPr lang="pl-PL"/>
           </a:p>
@@ -15710,9 +15710,9 @@
           <a:bodyPr/>
           <a:lstStyle/>
           <a:p>
-            <a:fld id="{B40F6218-F1E0-4DE5-A63A-12BA0C85EC3A}" type="datetime1">
+            <a:fld id="{ADE33A59-9393-4D44-B283-7D4D4DCF634A}" type="datetime1">
               <a:rPr lang="pl-PL" smtClean="0"/>
-              <a:t>2025-04-23</a:t>
+              <a:t>2025-10-15</a:t>
             </a:fld>
             <a:endParaRPr lang="pl-PL"/>
           </a:p>
@@ -16024,9 +16024,9 @@
           <a:bodyPr/>
           <a:lstStyle/>
           <a:p>
-            <a:fld id="{88B2ECC5-DE26-4FE0-AC4A-3D648318FC98}" type="datetime1">
+            <a:fld id="{9F1097E2-6CD5-42D0-89FC-D6980DA5A688}" type="datetime1">
               <a:rPr lang="pl-PL" smtClean="0"/>
-              <a:t>2025-04-23</a:t>
+              <a:t>2025-10-15</a:t>
             </a:fld>
             <a:endParaRPr lang="pl-PL"/>
           </a:p>
@@ -16318,9 +16318,9 @@
           <a:bodyPr/>
           <a:lstStyle/>
           <a:p>
-            <a:fld id="{EA231DA0-5477-422F-9607-9F1ED4880A68}" type="datetime1">
+            <a:fld id="{AC2715B9-B35B-4005-839C-F23122F267BB}" type="datetime1">
               <a:rPr lang="pl-PL" smtClean="0"/>
-              <a:t>2025-04-23</a:t>
+              <a:t>2025-10-15</a:t>
             </a:fld>
             <a:endParaRPr lang="pl-PL"/>
           </a:p>
@@ -16520,9 +16520,9 @@
           <a:bodyPr/>
           <a:lstStyle/>
           <a:p>
-            <a:fld id="{666E7798-4EA2-4B82-B2C7-6C5606ABF8B9}" type="datetime1">
+            <a:fld id="{BA0F37B5-2E61-4CE5-9ABD-641777247504}" type="datetime1">
               <a:rPr lang="pl-PL" smtClean="0"/>
-              <a:t>2025-04-23</a:t>
+              <a:t>2025-10-15</a:t>
             </a:fld>
             <a:endParaRPr lang="pl-PL"/>
           </a:p>
@@ -16721,9 +16721,9 @@
           <a:bodyPr/>
           <a:lstStyle/>
           <a:p>
-            <a:fld id="{632CEE22-6058-423D-9C81-7B449D5B43FE}" type="datetime1">
+            <a:fld id="{77F07BE5-ABB8-4F84-A4D6-9FE9CA984BE2}" type="datetime1">
               <a:rPr lang="pl-PL" smtClean="0"/>
-              <a:t>2025-04-23</a:t>
+              <a:t>2025-10-15</a:t>
             </a:fld>
             <a:endParaRPr lang="pl-PL"/>
           </a:p>
@@ -16932,9 +16932,9 @@
           <a:bodyPr/>
           <a:lstStyle/>
           <a:p>
-            <a:fld id="{89B9B44F-2D74-4E15-8393-F86EEE0208C0}" type="datetime1">
+            <a:fld id="{006CA893-E8A4-41D2-9B6B-AE035AD1380D}" type="datetime1">
               <a:rPr lang="pl-PL" smtClean="0"/>
-              <a:t>2025-04-23</a:t>
+              <a:t>2025-10-15</a:t>
             </a:fld>
             <a:endParaRPr lang="pl-PL"/>
           </a:p>
@@ -17193,9 +17193,9 @@
           <a:bodyPr/>
           <a:lstStyle/>
           <a:p>
-            <a:fld id="{D45E940A-5FC8-4907-AC88-B5F58EABFBC4}" type="datetime1">
+            <a:fld id="{83EF5E99-004D-4714-809A-11586056D54D}" type="datetime1">
               <a:rPr lang="pl-PL" smtClean="0"/>
-              <a:t>2025-04-23</a:t>
+              <a:t>2025-10-15</a:t>
             </a:fld>
             <a:endParaRPr lang="pl-PL"/>
           </a:p>
@@ -17461,9 +17461,9 @@
           <a:bodyPr/>
           <a:lstStyle/>
           <a:p>
-            <a:fld id="{1B5B28CA-77A3-47DD-9A46-BFA6ACB731EB}" type="datetime1">
+            <a:fld id="{D6F39A18-2D76-4FD1-BCBD-C48268E60FE4}" type="datetime1">
               <a:rPr lang="pl-PL" smtClean="0"/>
-              <a:t>2025-04-23</a:t>
+              <a:t>2025-10-15</a:t>
             </a:fld>
             <a:endParaRPr lang="pl-PL"/>
           </a:p>
@@ -17785,9 +17785,9 @@
           <a:bodyPr/>
           <a:lstStyle/>
           <a:p>
-            <a:fld id="{AFA9C5B5-9408-475A-9E8A-1AA28D78BF7B}" type="datetime1">
+            <a:fld id="{F209248F-0EF8-4D28-9764-40FF4F232221}" type="datetime1">
               <a:rPr lang="pl-PL" smtClean="0"/>
-              <a:t>2025-04-23</a:t>
+              <a:t>2025-10-15</a:t>
             </a:fld>
             <a:endParaRPr lang="pl-PL"/>
           </a:p>
@@ -18057,9 +18057,9 @@
           <a:bodyPr/>
           <a:lstStyle/>
           <a:p>
-            <a:fld id="{EF0C29E5-3594-4D0F-A184-CEC2F1FC2F49}" type="datetime1">
+            <a:fld id="{5263DCD5-9CDC-44CF-B048-F92A98229DB3}" type="datetime1">
               <a:rPr lang="pl-PL" smtClean="0"/>
-              <a:t>2025-04-23</a:t>
+              <a:t>2025-10-15</a:t>
             </a:fld>
             <a:endParaRPr lang="pl-PL"/>
           </a:p>
@@ -18431,9 +18431,9 @@
           <a:bodyPr/>
           <a:lstStyle/>
           <a:p>
-            <a:fld id="{2B3190AB-3CC1-4362-B588-9F247754C8E4}" type="datetime1">
+            <a:fld id="{F9889DA2-81C6-4E1A-BCFE-F055077C380C}" type="datetime1">
               <a:rPr lang="pl-PL" smtClean="0"/>
-              <a:t>2025-04-23</a:t>
+              <a:t>2025-10-15</a:t>
             </a:fld>
             <a:endParaRPr lang="pl-PL"/>
           </a:p>
@@ -18860,9 +18860,9 @@
             </a:lvl1pPr>
           </a:lstStyle>
           <a:p>
-            <a:fld id="{3EB5CCFE-143F-4C76-92D7-4F1AE18BFE96}" type="datetime1">
+            <a:fld id="{578222DE-7ECD-4AF9-B589-66CF19B6DCBF}" type="datetime1">
               <a:rPr lang="pl-PL" smtClean="0"/>
-              <a:t>2025-04-23</a:t>
+              <a:t>2025-10-15</a:t>
             </a:fld>
             <a:endParaRPr lang="pl-PL" dirty="0"/>
           </a:p>
@@ -20275,7 +20275,7 @@
     <p:sldLayoutId id="2147483658" r:id="rId40"/>
     <p:sldLayoutId id="2147483659" r:id="rId41"/>
   </p:sldLayoutIdLst>
-  <p:hf hdr="0" dt="0"/>
+  <p:hf sldNum="0" hdr="0" dt="0"/>
   <p:txStyles>
     <p:titleStyle>
       <a:lvl1pPr algn="l" defTabSz="914400" rtl="0" eaLnBrk="1" latinLnBrk="0" hangingPunct="1">
@@ -20840,6 +20840,14 @@
 <file path=ppt/slides/slide10.xml><?xml version="1.0" encoding="utf-8"?>
 <p:sld xmlns:a="http://schemas.openxmlformats.org/drawingml/2006/main" xmlns:r="http://schemas.openxmlformats.org/officeDocument/2006/relationships" xmlns:p="http://schemas.openxmlformats.org/presentationml/2006/main">
   <p:cSld>
+    <p:bg>
+      <p:bgPr>
+        <a:solidFill>
+          <a:schemeClr val="bg1"/>
+        </a:solidFill>
+        <a:effectLst/>
+      </p:bgPr>
+    </p:bg>
     <p:spTree>
       <p:nvGrpSpPr>
         <p:cNvPr id="1" name=""/>
@@ -21592,35 +21600,6 @@
               <a:rPr lang="pl-PL"/>
               <a:t>Czym jest system kontroli GIT i jak wykorzystać go w praktyce?</a:t>
             </a:r>
-          </a:p>
-        </p:txBody>
-      </p:sp>
-      <p:sp>
-        <p:nvSpPr>
-          <p:cNvPr id="6" name="Symbol zastępczy numeru slajdu 5">
-            <a:extLst>
-              <a:ext uri="{FF2B5EF4-FFF2-40B4-BE49-F238E27FC236}">
-                <a16:creationId xmlns:a16="http://schemas.microsoft.com/office/drawing/2014/main" id="{4FAACE8B-F7B4-CB07-8819-05E30730099A}"/>
-              </a:ext>
-            </a:extLst>
-          </p:cNvPr>
-          <p:cNvSpPr>
-            <a:spLocks noGrp="1"/>
-          </p:cNvSpPr>
-          <p:nvPr>
-            <p:ph type="sldNum" sz="quarter" idx="12"/>
-          </p:nvPr>
-        </p:nvSpPr>
-        <p:spPr/>
-        <p:txBody>
-          <a:bodyPr/>
-          <a:lstStyle/>
-          <a:p>
-            <a:fld id="{5D6A1B8B-EBFB-4D99-BFCD-780F9970EEE1}" type="slidenum">
-              <a:rPr lang="pl-PL" smtClean="0"/>
-              <a:t>10</a:t>
-            </a:fld>
-            <a:endParaRPr lang="pl-PL"/>
           </a:p>
         </p:txBody>
       </p:sp>
@@ -22380,35 +22359,6 @@
           </a:p>
         </p:txBody>
       </p:sp>
-      <p:sp>
-        <p:nvSpPr>
-          <p:cNvPr id="6" name="Symbol zastępczy numeru slajdu 5">
-            <a:extLst>
-              <a:ext uri="{FF2B5EF4-FFF2-40B4-BE49-F238E27FC236}">
-                <a16:creationId xmlns:a16="http://schemas.microsoft.com/office/drawing/2014/main" id="{FDBF8D9B-E454-0035-278D-FE01C3CD30BF}"/>
-              </a:ext>
-            </a:extLst>
-          </p:cNvPr>
-          <p:cNvSpPr>
-            <a:spLocks noGrp="1"/>
-          </p:cNvSpPr>
-          <p:nvPr>
-            <p:ph type="sldNum" sz="quarter" idx="12"/>
-          </p:nvPr>
-        </p:nvSpPr>
-        <p:spPr/>
-        <p:txBody>
-          <a:bodyPr/>
-          <a:lstStyle/>
-          <a:p>
-            <a:fld id="{5D6A1B8B-EBFB-4D99-BFCD-780F9970EEE1}" type="slidenum">
-              <a:rPr lang="pl-PL" smtClean="0"/>
-              <a:t>11</a:t>
-            </a:fld>
-            <a:endParaRPr lang="pl-PL"/>
-          </a:p>
-        </p:txBody>
-      </p:sp>
     </p:spTree>
     <p:extLst>
       <p:ext uri="{BB962C8B-B14F-4D97-AF65-F5344CB8AC3E}">
@@ -22553,35 +22503,6 @@
           </a:p>
         </p:txBody>
       </p:sp>
-      <p:sp>
-        <p:nvSpPr>
-          <p:cNvPr id="3" name="Symbol zastępczy numeru slajdu 2">
-            <a:extLst>
-              <a:ext uri="{FF2B5EF4-FFF2-40B4-BE49-F238E27FC236}">
-                <a16:creationId xmlns:a16="http://schemas.microsoft.com/office/drawing/2014/main" id="{D5023366-78DB-3DF5-B627-15306E2A1B0B}"/>
-              </a:ext>
-            </a:extLst>
-          </p:cNvPr>
-          <p:cNvSpPr>
-            <a:spLocks noGrp="1"/>
-          </p:cNvSpPr>
-          <p:nvPr>
-            <p:ph type="sldNum" sz="quarter" idx="12"/>
-          </p:nvPr>
-        </p:nvSpPr>
-        <p:spPr/>
-        <p:txBody>
-          <a:bodyPr/>
-          <a:lstStyle/>
-          <a:p>
-            <a:fld id="{5D6A1B8B-EBFB-4D99-BFCD-780F9970EEE1}" type="slidenum">
-              <a:rPr lang="pl-PL" smtClean="0"/>
-              <a:t>12</a:t>
-            </a:fld>
-            <a:endParaRPr lang="pl-PL"/>
-          </a:p>
-        </p:txBody>
-      </p:sp>
     </p:spTree>
     <p:extLst>
       <p:ext uri="{BB962C8B-B14F-4D97-AF65-F5344CB8AC3E}">
@@ -22888,35 +22809,6 @@
           </a:p>
         </p:txBody>
       </p:sp>
-      <p:sp>
-        <p:nvSpPr>
-          <p:cNvPr id="4" name="Symbol zastępczy numeru slajdu 3">
-            <a:extLst>
-              <a:ext uri="{FF2B5EF4-FFF2-40B4-BE49-F238E27FC236}">
-                <a16:creationId xmlns:a16="http://schemas.microsoft.com/office/drawing/2014/main" id="{7856753D-0572-D4ED-8EB8-7AFE26A0EC71}"/>
-              </a:ext>
-            </a:extLst>
-          </p:cNvPr>
-          <p:cNvSpPr>
-            <a:spLocks noGrp="1"/>
-          </p:cNvSpPr>
-          <p:nvPr>
-            <p:ph type="sldNum" sz="quarter" idx="12"/>
-          </p:nvPr>
-        </p:nvSpPr>
-        <p:spPr/>
-        <p:txBody>
-          <a:bodyPr/>
-          <a:lstStyle/>
-          <a:p>
-            <a:fld id="{5D6A1B8B-EBFB-4D99-BFCD-780F9970EEE1}" type="slidenum">
-              <a:rPr lang="pl-PL" smtClean="0"/>
-              <a:t>13</a:t>
-            </a:fld>
-            <a:endParaRPr lang="pl-PL"/>
-          </a:p>
-        </p:txBody>
-      </p:sp>
     </p:spTree>
     <p:extLst>
       <p:ext uri="{BB962C8B-B14F-4D97-AF65-F5344CB8AC3E}">
@@ -23160,35 +23052,6 @@
           </a:p>
         </p:txBody>
       </p:sp>
-      <p:sp>
-        <p:nvSpPr>
-          <p:cNvPr id="4" name="Symbol zastępczy numeru slajdu 3">
-            <a:extLst>
-              <a:ext uri="{FF2B5EF4-FFF2-40B4-BE49-F238E27FC236}">
-                <a16:creationId xmlns:a16="http://schemas.microsoft.com/office/drawing/2014/main" id="{F2015CC9-72A8-2FA9-FA30-320CA48FA7F0}"/>
-              </a:ext>
-            </a:extLst>
-          </p:cNvPr>
-          <p:cNvSpPr>
-            <a:spLocks noGrp="1"/>
-          </p:cNvSpPr>
-          <p:nvPr>
-            <p:ph type="sldNum" sz="quarter" idx="12"/>
-          </p:nvPr>
-        </p:nvSpPr>
-        <p:spPr/>
-        <p:txBody>
-          <a:bodyPr/>
-          <a:lstStyle/>
-          <a:p>
-            <a:fld id="{5D6A1B8B-EBFB-4D99-BFCD-780F9970EEE1}" type="slidenum">
-              <a:rPr lang="pl-PL" smtClean="0"/>
-              <a:t>14</a:t>
-            </a:fld>
-            <a:endParaRPr lang="pl-PL"/>
-          </a:p>
-        </p:txBody>
-      </p:sp>
     </p:spTree>
     <p:extLst>
       <p:ext uri="{BB962C8B-B14F-4D97-AF65-F5344CB8AC3E}">
@@ -23478,35 +23341,6 @@
           </a:p>
         </p:txBody>
       </p:sp>
-      <p:sp>
-        <p:nvSpPr>
-          <p:cNvPr id="4" name="Symbol zastępczy numeru slajdu 3">
-            <a:extLst>
-              <a:ext uri="{FF2B5EF4-FFF2-40B4-BE49-F238E27FC236}">
-                <a16:creationId xmlns:a16="http://schemas.microsoft.com/office/drawing/2014/main" id="{004595E3-8D55-D30C-1F84-D3BD040062F2}"/>
-              </a:ext>
-            </a:extLst>
-          </p:cNvPr>
-          <p:cNvSpPr>
-            <a:spLocks noGrp="1"/>
-          </p:cNvSpPr>
-          <p:nvPr>
-            <p:ph type="sldNum" sz="quarter" idx="12"/>
-          </p:nvPr>
-        </p:nvSpPr>
-        <p:spPr/>
-        <p:txBody>
-          <a:bodyPr/>
-          <a:lstStyle/>
-          <a:p>
-            <a:fld id="{5D6A1B8B-EBFB-4D99-BFCD-780F9970EEE1}" type="slidenum">
-              <a:rPr lang="pl-PL" smtClean="0"/>
-              <a:t>15</a:t>
-            </a:fld>
-            <a:endParaRPr lang="pl-PL"/>
-          </a:p>
-        </p:txBody>
-      </p:sp>
     </p:spTree>
     <p:extLst>
       <p:ext uri="{BB962C8B-B14F-4D97-AF65-F5344CB8AC3E}">
@@ -23651,35 +23485,6 @@
           </a:p>
         </p:txBody>
       </p:sp>
-      <p:sp>
-        <p:nvSpPr>
-          <p:cNvPr id="3" name="Symbol zastępczy numeru slajdu 2">
-            <a:extLst>
-              <a:ext uri="{FF2B5EF4-FFF2-40B4-BE49-F238E27FC236}">
-                <a16:creationId xmlns:a16="http://schemas.microsoft.com/office/drawing/2014/main" id="{F05BC80C-61E7-5866-B45E-8DA8BFA1D388}"/>
-              </a:ext>
-            </a:extLst>
-          </p:cNvPr>
-          <p:cNvSpPr>
-            <a:spLocks noGrp="1"/>
-          </p:cNvSpPr>
-          <p:nvPr>
-            <p:ph type="sldNum" sz="quarter" idx="12"/>
-          </p:nvPr>
-        </p:nvSpPr>
-        <p:spPr/>
-        <p:txBody>
-          <a:bodyPr/>
-          <a:lstStyle/>
-          <a:p>
-            <a:fld id="{5D6A1B8B-EBFB-4D99-BFCD-780F9970EEE1}" type="slidenum">
-              <a:rPr lang="pl-PL" smtClean="0"/>
-              <a:t>16</a:t>
-            </a:fld>
-            <a:endParaRPr lang="pl-PL"/>
-          </a:p>
-        </p:txBody>
-      </p:sp>
     </p:spTree>
     <p:extLst>
       <p:ext uri="{BB962C8B-B14F-4D97-AF65-F5344CB8AC3E}">
@@ -23936,11 +23741,11 @@
               <a:buAutoNum type="arabicPeriod"/>
             </a:pPr>
             <a:r>
-              <a:rPr lang="pl-PL" dirty="0">
+              <a:rPr lang="pl-PL">
                 <a:latin typeface="Arial" panose="020B0604020202020204" pitchFamily="34" charset="0"/>
                 <a:cs typeface="Arial" panose="020B0604020202020204" pitchFamily="34" charset="0"/>
               </a:rPr>
-              <a:t>Dodaj repozytorium do lokalnego OneDrive: </a:t>
+              <a:t>Skopiuj ścieżkę repozytorium zdalnego: </a:t>
             </a:r>
             <a:r>
               <a:rPr lang="pl-PL" dirty="0">
@@ -24105,140 +23910,6 @@
           </a:p>
         </p:txBody>
       </p:sp>
-      <p:pic>
-        <p:nvPicPr>
-          <p:cNvPr id="8" name="Obraz 7">
-            <a:extLst>
-              <a:ext uri="{FF2B5EF4-FFF2-40B4-BE49-F238E27FC236}">
-                <a16:creationId xmlns:a16="http://schemas.microsoft.com/office/drawing/2014/main" id="{F97BDF36-341B-E5E2-5944-E5A456A7FFD9}"/>
-              </a:ext>
-            </a:extLst>
-          </p:cNvPr>
-          <p:cNvPicPr>
-            <a:picLocks noChangeAspect="1"/>
-          </p:cNvPicPr>
-          <p:nvPr/>
-        </p:nvPicPr>
-        <p:blipFill>
-          <a:blip r:embed="rId3"/>
-          <a:stretch>
-            <a:fillRect/>
-          </a:stretch>
-        </p:blipFill>
-        <p:spPr>
-          <a:xfrm>
-            <a:off x="7503192" y="985188"/>
-            <a:ext cx="2162111" cy="1469127"/>
-          </a:xfrm>
-          <a:prstGeom prst="rect">
-            <a:avLst/>
-          </a:prstGeom>
-          <a:ln>
-            <a:solidFill>
-              <a:schemeClr val="bg1">
-                <a:lumMod val="50000"/>
-              </a:schemeClr>
-            </a:solidFill>
-          </a:ln>
-        </p:spPr>
-      </p:pic>
-      <p:cxnSp>
-        <p:nvCxnSpPr>
-          <p:cNvPr id="12" name="Łącznik prosty ze strzałką 11">
-            <a:extLst>
-              <a:ext uri="{FF2B5EF4-FFF2-40B4-BE49-F238E27FC236}">
-                <a16:creationId xmlns:a16="http://schemas.microsoft.com/office/drawing/2014/main" id="{2874C31A-4BAB-5C69-F263-FE5032D816F7}"/>
-              </a:ext>
-            </a:extLst>
-          </p:cNvPr>
-          <p:cNvCxnSpPr>
-            <a:cxnSpLocks/>
-          </p:cNvCxnSpPr>
-          <p:nvPr/>
-        </p:nvCxnSpPr>
-        <p:spPr>
-          <a:xfrm flipV="1">
-            <a:off x="5879424" y="1948441"/>
-            <a:ext cx="1213585" cy="299103"/>
-          </a:xfrm>
-          <a:prstGeom prst="straightConnector1">
-            <a:avLst/>
-          </a:prstGeom>
-          <a:ln w="38100">
-            <a:solidFill>
-              <a:schemeClr val="accent2">
-                <a:lumMod val="20000"/>
-                <a:lumOff val="80000"/>
-              </a:schemeClr>
-            </a:solidFill>
-            <a:tailEnd type="triangle"/>
-          </a:ln>
-        </p:spPr>
-        <p:style>
-          <a:lnRef idx="1">
-            <a:schemeClr val="accent1"/>
-          </a:lnRef>
-          <a:fillRef idx="0">
-            <a:schemeClr val="accent1"/>
-          </a:fillRef>
-          <a:effectRef idx="0">
-            <a:schemeClr val="accent1"/>
-          </a:effectRef>
-          <a:fontRef idx="minor">
-            <a:schemeClr val="tx1"/>
-          </a:fontRef>
-        </p:style>
-      </p:cxnSp>
-      <p:sp>
-        <p:nvSpPr>
-          <p:cNvPr id="14" name="Prostokąt 13">
-            <a:extLst>
-              <a:ext uri="{FF2B5EF4-FFF2-40B4-BE49-F238E27FC236}">
-                <a16:creationId xmlns:a16="http://schemas.microsoft.com/office/drawing/2014/main" id="{2DCBAC44-0419-5894-7192-18403D4A30A6}"/>
-              </a:ext>
-            </a:extLst>
-          </p:cNvPr>
-          <p:cNvSpPr/>
-          <p:nvPr/>
-        </p:nvSpPr>
-        <p:spPr>
-          <a:xfrm>
-            <a:off x="7563028" y="1719751"/>
-            <a:ext cx="1982624" cy="408152"/>
-          </a:xfrm>
-          <a:prstGeom prst="rect">
-            <a:avLst/>
-          </a:prstGeom>
-          <a:noFill/>
-          <a:ln w="28575">
-            <a:solidFill>
-              <a:schemeClr val="accent1"/>
-            </a:solidFill>
-          </a:ln>
-        </p:spPr>
-        <p:style>
-          <a:lnRef idx="2">
-            <a:schemeClr val="accent1"/>
-          </a:lnRef>
-          <a:fillRef idx="1">
-            <a:schemeClr val="lt1"/>
-          </a:fillRef>
-          <a:effectRef idx="0">
-            <a:schemeClr val="accent1"/>
-          </a:effectRef>
-          <a:fontRef idx="minor">
-            <a:schemeClr val="dk1"/>
-          </a:fontRef>
-        </p:style>
-        <p:txBody>
-          <a:bodyPr rtlCol="0" anchor="ctr"/>
-          <a:lstStyle/>
-          <a:p>
-            <a:pPr algn="ctr"/>
-            <a:endParaRPr lang="pl-PL"/>
-          </a:p>
-        </p:txBody>
-      </p:sp>
       <p:sp>
         <p:nvSpPr>
           <p:cNvPr id="2" name="Symbol zastępczy stopki 1">
@@ -24264,35 +23935,6 @@
               <a:rPr lang="pl-PL"/>
               <a:t>Czym jest system kontroli GIT i jak wykorzystać go w praktyce?</a:t>
             </a:r>
-          </a:p>
-        </p:txBody>
-      </p:sp>
-      <p:sp>
-        <p:nvSpPr>
-          <p:cNvPr id="4" name="Symbol zastępczy numeru slajdu 3">
-            <a:extLst>
-              <a:ext uri="{FF2B5EF4-FFF2-40B4-BE49-F238E27FC236}">
-                <a16:creationId xmlns:a16="http://schemas.microsoft.com/office/drawing/2014/main" id="{D95C69A2-DB81-A3D4-5368-91099FD55E38}"/>
-              </a:ext>
-            </a:extLst>
-          </p:cNvPr>
-          <p:cNvSpPr>
-            <a:spLocks noGrp="1"/>
-          </p:cNvSpPr>
-          <p:nvPr>
-            <p:ph type="sldNum" sz="quarter" idx="12"/>
-          </p:nvPr>
-        </p:nvSpPr>
-        <p:spPr/>
-        <p:txBody>
-          <a:bodyPr/>
-          <a:lstStyle/>
-          <a:p>
-            <a:fld id="{5D6A1B8B-EBFB-4D99-BFCD-780F9970EEE1}" type="slidenum">
-              <a:rPr lang="pl-PL" smtClean="0"/>
-              <a:t>17</a:t>
-            </a:fld>
-            <a:endParaRPr lang="pl-PL"/>
           </a:p>
         </p:txBody>
       </p:sp>
@@ -24583,35 +24225,6 @@
           </a:p>
         </p:txBody>
       </p:sp>
-      <p:sp>
-        <p:nvSpPr>
-          <p:cNvPr id="6" name="Symbol zastępczy numeru slajdu 5">
-            <a:extLst>
-              <a:ext uri="{FF2B5EF4-FFF2-40B4-BE49-F238E27FC236}">
-                <a16:creationId xmlns:a16="http://schemas.microsoft.com/office/drawing/2014/main" id="{E4939832-9CAA-C0F7-A59C-B7B72608FC16}"/>
-              </a:ext>
-            </a:extLst>
-          </p:cNvPr>
-          <p:cNvSpPr>
-            <a:spLocks noGrp="1"/>
-          </p:cNvSpPr>
-          <p:nvPr>
-            <p:ph type="sldNum" sz="quarter" idx="12"/>
-          </p:nvPr>
-        </p:nvSpPr>
-        <p:spPr/>
-        <p:txBody>
-          <a:bodyPr/>
-          <a:lstStyle/>
-          <a:p>
-            <a:fld id="{5D6A1B8B-EBFB-4D99-BFCD-780F9970EEE1}" type="slidenum">
-              <a:rPr lang="pl-PL" smtClean="0"/>
-              <a:t>2</a:t>
-            </a:fld>
-            <a:endParaRPr lang="pl-PL"/>
-          </a:p>
-        </p:txBody>
-      </p:sp>
     </p:spTree>
     <p:extLst>
       <p:ext uri="{BB962C8B-B14F-4D97-AF65-F5344CB8AC3E}">
@@ -24753,35 +24366,6 @@
               <a:rPr lang="pl-PL"/>
               <a:t>Czym jest system kontroli GIT i jak wykorzystać go w praktyce?</a:t>
             </a:r>
-          </a:p>
-        </p:txBody>
-      </p:sp>
-      <p:sp>
-        <p:nvSpPr>
-          <p:cNvPr id="3" name="Symbol zastępczy numeru slajdu 2">
-            <a:extLst>
-              <a:ext uri="{FF2B5EF4-FFF2-40B4-BE49-F238E27FC236}">
-                <a16:creationId xmlns:a16="http://schemas.microsoft.com/office/drawing/2014/main" id="{0622793F-AD4E-58C8-8418-EEC835882F92}"/>
-              </a:ext>
-            </a:extLst>
-          </p:cNvPr>
-          <p:cNvSpPr>
-            <a:spLocks noGrp="1"/>
-          </p:cNvSpPr>
-          <p:nvPr>
-            <p:ph type="sldNum" sz="quarter" idx="12"/>
-          </p:nvPr>
-        </p:nvSpPr>
-        <p:spPr/>
-        <p:txBody>
-          <a:bodyPr/>
-          <a:lstStyle/>
-          <a:p>
-            <a:fld id="{5D6A1B8B-EBFB-4D99-BFCD-780F9970EEE1}" type="slidenum">
-              <a:rPr lang="pl-PL" smtClean="0"/>
-              <a:t>3</a:t>
-            </a:fld>
-            <a:endParaRPr lang="pl-PL"/>
           </a:p>
         </p:txBody>
       </p:sp>
@@ -25654,35 +25238,6 @@
           </a:p>
         </p:txBody>
       </p:sp>
-      <p:sp>
-        <p:nvSpPr>
-          <p:cNvPr id="4" name="Symbol zastępczy numeru slajdu 3">
-            <a:extLst>
-              <a:ext uri="{FF2B5EF4-FFF2-40B4-BE49-F238E27FC236}">
-                <a16:creationId xmlns:a16="http://schemas.microsoft.com/office/drawing/2014/main" id="{CBAAF8AA-1413-8290-5F74-3C75EE75ADEF}"/>
-              </a:ext>
-            </a:extLst>
-          </p:cNvPr>
-          <p:cNvSpPr>
-            <a:spLocks noGrp="1"/>
-          </p:cNvSpPr>
-          <p:nvPr>
-            <p:ph type="sldNum" sz="quarter" idx="12"/>
-          </p:nvPr>
-        </p:nvSpPr>
-        <p:spPr/>
-        <p:txBody>
-          <a:bodyPr/>
-          <a:lstStyle/>
-          <a:p>
-            <a:fld id="{5D6A1B8B-EBFB-4D99-BFCD-780F9970EEE1}" type="slidenum">
-              <a:rPr lang="pl-PL" smtClean="0"/>
-              <a:t>4</a:t>
-            </a:fld>
-            <a:endParaRPr lang="pl-PL"/>
-          </a:p>
-        </p:txBody>
-      </p:sp>
     </p:spTree>
     <p:extLst>
       <p:ext uri="{BB962C8B-B14F-4D97-AF65-F5344CB8AC3E}">
@@ -26009,35 +25564,6 @@
               <a:rPr lang="pl-PL"/>
               <a:t>Czym jest system kontroli GIT i jak wykorzystać go w praktyce?</a:t>
             </a:r>
-          </a:p>
-        </p:txBody>
-      </p:sp>
-      <p:sp>
-        <p:nvSpPr>
-          <p:cNvPr id="4" name="Symbol zastępczy numeru slajdu 3">
-            <a:extLst>
-              <a:ext uri="{FF2B5EF4-FFF2-40B4-BE49-F238E27FC236}">
-                <a16:creationId xmlns:a16="http://schemas.microsoft.com/office/drawing/2014/main" id="{8A7BECE1-5F5D-AAC9-CF62-530D1AD4D6A4}"/>
-              </a:ext>
-            </a:extLst>
-          </p:cNvPr>
-          <p:cNvSpPr>
-            <a:spLocks noGrp="1"/>
-          </p:cNvSpPr>
-          <p:nvPr>
-            <p:ph type="sldNum" sz="quarter" idx="12"/>
-          </p:nvPr>
-        </p:nvSpPr>
-        <p:spPr/>
-        <p:txBody>
-          <a:bodyPr/>
-          <a:lstStyle/>
-          <a:p>
-            <a:fld id="{5D6A1B8B-EBFB-4D99-BFCD-780F9970EEE1}" type="slidenum">
-              <a:rPr lang="pl-PL" smtClean="0"/>
-              <a:t>5</a:t>
-            </a:fld>
-            <a:endParaRPr lang="pl-PL"/>
           </a:p>
         </p:txBody>
       </p:sp>
@@ -27737,35 +27263,6 @@
           </a:p>
         </p:txBody>
       </p:sp>
-      <p:sp>
-        <p:nvSpPr>
-          <p:cNvPr id="4" name="Symbol zastępczy numeru slajdu 3">
-            <a:extLst>
-              <a:ext uri="{FF2B5EF4-FFF2-40B4-BE49-F238E27FC236}">
-                <a16:creationId xmlns:a16="http://schemas.microsoft.com/office/drawing/2014/main" id="{BA425A3F-A3D0-D2CB-EA45-DC1B3026CB74}"/>
-              </a:ext>
-            </a:extLst>
-          </p:cNvPr>
-          <p:cNvSpPr>
-            <a:spLocks noGrp="1"/>
-          </p:cNvSpPr>
-          <p:nvPr>
-            <p:ph type="sldNum" sz="quarter" idx="12"/>
-          </p:nvPr>
-        </p:nvSpPr>
-        <p:spPr/>
-        <p:txBody>
-          <a:bodyPr/>
-          <a:lstStyle/>
-          <a:p>
-            <a:fld id="{5D6A1B8B-EBFB-4D99-BFCD-780F9970EEE1}" type="slidenum">
-              <a:rPr lang="pl-PL" smtClean="0"/>
-              <a:t>6</a:t>
-            </a:fld>
-            <a:endParaRPr lang="pl-PL"/>
-          </a:p>
-        </p:txBody>
-      </p:sp>
     </p:spTree>
     <p:extLst>
       <p:ext uri="{BB962C8B-B14F-4D97-AF65-F5344CB8AC3E}">
@@ -27908,35 +27405,6 @@
               <a:rPr lang="pl-PL"/>
               <a:t>Czym jest system kontroli GIT i jak wykorzystać go w praktyce?</a:t>
             </a:r>
-          </a:p>
-        </p:txBody>
-      </p:sp>
-      <p:sp>
-        <p:nvSpPr>
-          <p:cNvPr id="3" name="Symbol zastępczy numeru slajdu 2">
-            <a:extLst>
-              <a:ext uri="{FF2B5EF4-FFF2-40B4-BE49-F238E27FC236}">
-                <a16:creationId xmlns:a16="http://schemas.microsoft.com/office/drawing/2014/main" id="{ED9734BD-FFE8-4C13-4E30-CAC2407FD186}"/>
-              </a:ext>
-            </a:extLst>
-          </p:cNvPr>
-          <p:cNvSpPr>
-            <a:spLocks noGrp="1"/>
-          </p:cNvSpPr>
-          <p:nvPr>
-            <p:ph type="sldNum" sz="quarter" idx="12"/>
-          </p:nvPr>
-        </p:nvSpPr>
-        <p:spPr/>
-        <p:txBody>
-          <a:bodyPr/>
-          <a:lstStyle/>
-          <a:p>
-            <a:fld id="{5D6A1B8B-EBFB-4D99-BFCD-780F9970EEE1}" type="slidenum">
-              <a:rPr lang="pl-PL" smtClean="0"/>
-              <a:t>7</a:t>
-            </a:fld>
-            <a:endParaRPr lang="pl-PL"/>
           </a:p>
         </p:txBody>
       </p:sp>
@@ -28605,35 +28073,6 @@
           </a:p>
         </p:txBody>
       </p:sp>
-      <p:sp>
-        <p:nvSpPr>
-          <p:cNvPr id="3" name="Symbol zastępczy numeru slajdu 2">
-            <a:extLst>
-              <a:ext uri="{FF2B5EF4-FFF2-40B4-BE49-F238E27FC236}">
-                <a16:creationId xmlns:a16="http://schemas.microsoft.com/office/drawing/2014/main" id="{8645D9CF-D2E4-8FDB-1A63-98BDF700434A}"/>
-              </a:ext>
-            </a:extLst>
-          </p:cNvPr>
-          <p:cNvSpPr>
-            <a:spLocks noGrp="1"/>
-          </p:cNvSpPr>
-          <p:nvPr>
-            <p:ph type="sldNum" sz="quarter" idx="12"/>
-          </p:nvPr>
-        </p:nvSpPr>
-        <p:spPr/>
-        <p:txBody>
-          <a:bodyPr/>
-          <a:lstStyle/>
-          <a:p>
-            <a:fld id="{5D6A1B8B-EBFB-4D99-BFCD-780F9970EEE1}" type="slidenum">
-              <a:rPr lang="pl-PL" smtClean="0"/>
-              <a:t>8</a:t>
-            </a:fld>
-            <a:endParaRPr lang="pl-PL"/>
-          </a:p>
-        </p:txBody>
-      </p:sp>
     </p:spTree>
     <p:extLst>
       <p:ext uri="{BB962C8B-B14F-4D97-AF65-F5344CB8AC3E}">
@@ -29166,35 +28605,6 @@
               <a:rPr lang="pl-PL"/>
               <a:t>Czym jest system kontroli GIT i jak wykorzystać go w praktyce?</a:t>
             </a:r>
-          </a:p>
-        </p:txBody>
-      </p:sp>
-      <p:sp>
-        <p:nvSpPr>
-          <p:cNvPr id="3" name="Symbol zastępczy numeru slajdu 2">
-            <a:extLst>
-              <a:ext uri="{FF2B5EF4-FFF2-40B4-BE49-F238E27FC236}">
-                <a16:creationId xmlns:a16="http://schemas.microsoft.com/office/drawing/2014/main" id="{F2A61BA8-6C11-6910-713B-0873C29D0893}"/>
-              </a:ext>
-            </a:extLst>
-          </p:cNvPr>
-          <p:cNvSpPr>
-            <a:spLocks noGrp="1"/>
-          </p:cNvSpPr>
-          <p:nvPr>
-            <p:ph type="sldNum" sz="quarter" idx="12"/>
-          </p:nvPr>
-        </p:nvSpPr>
-        <p:spPr/>
-        <p:txBody>
-          <a:bodyPr/>
-          <a:lstStyle/>
-          <a:p>
-            <a:fld id="{5D6A1B8B-EBFB-4D99-BFCD-780F9970EEE1}" type="slidenum">
-              <a:rPr lang="pl-PL" smtClean="0"/>
-              <a:t>9</a:t>
-            </a:fld>
-            <a:endParaRPr lang="pl-PL"/>
           </a:p>
         </p:txBody>
       </p:sp>

</xml_diff>